<commit_message>
Minor updates to the slide.
</commit_message>
<xml_diff>
--- a/EDMUG Meetup 2019-05-28.pptx
+++ b/EDMUG Meetup 2019-05-28.pptx
@@ -217,7 +217,7 @@
           <a:p>
             <a:fld id="{60DACAEE-CE27-A44E-8214-0B7C88BB09EE}" type="datetimeFigureOut">
               <a:rPr lang="en-US" smtClean="0"/>
-              <a:t>5/27/2019</a:t>
+              <a:t>5/28/19</a:t>
             </a:fld>
             <a:endParaRPr lang="en-US"/>
           </a:p>
@@ -717,15 +717,7 @@
             </a:pPr>
             <a:r>
               <a:rPr lang="en-US" dirty="0"/>
-              <a:t>Next meetup is May 28</a:t>
-            </a:r>
-            <a:r>
-              <a:rPr lang="en-US" baseline="30000" dirty="0"/>
-              <a:t>th</a:t>
-            </a:r>
-            <a:r>
-              <a:rPr lang="en-US" dirty="0"/>
-              <a:t>.  Working on confirming the speaker.  Looking for June and fall 2019 presenters.</a:t>
+              <a:t>Next meetup???</a:t>
             </a:r>
           </a:p>
           <a:p>
@@ -879,7 +871,25 @@
           <a:p>
             <a:r>
               <a:rPr lang="en-US" dirty="0"/>
-              <a:t>Process Solutions, JetBrains.  Any other sponsors?</a:t>
+              <a:t>PSLC new logo and swag.</a:t>
+            </a:r>
+          </a:p>
+          <a:p>
+            <a:endParaRPr lang="en-US" dirty="0"/>
+          </a:p>
+          <a:p>
+            <a:r>
+              <a:rPr lang="en-US" dirty="0"/>
+              <a:t>JetBrains.  </a:t>
+            </a:r>
+          </a:p>
+          <a:p>
+            <a:endParaRPr lang="en-US" dirty="0"/>
+          </a:p>
+          <a:p>
+            <a:r>
+              <a:rPr lang="en-US" dirty="0"/>
+              <a:t>Any other sponsors?</a:t>
             </a:r>
           </a:p>
         </p:txBody>
@@ -1241,7 +1251,7 @@
           <a:p>
             <a:fld id="{C77E8E39-1E32-2646-9620-EB65EC065088}" type="datetimeFigureOut">
               <a:rPr lang="en-US" smtClean="0"/>
-              <a:t>5/27/2019</a:t>
+              <a:t>5/28/19</a:t>
             </a:fld>
             <a:endParaRPr lang="en-US"/>
           </a:p>
@@ -1409,7 +1419,7 @@
           <a:p>
             <a:fld id="{C77E8E39-1E32-2646-9620-EB65EC065088}" type="datetimeFigureOut">
               <a:rPr lang="en-US" smtClean="0"/>
-              <a:t>5/27/2019</a:t>
+              <a:t>5/28/19</a:t>
             </a:fld>
             <a:endParaRPr lang="en-US"/>
           </a:p>
@@ -1587,7 +1597,7 @@
           <a:p>
             <a:fld id="{C77E8E39-1E32-2646-9620-EB65EC065088}" type="datetimeFigureOut">
               <a:rPr lang="en-US" smtClean="0"/>
-              <a:t>5/27/2019</a:t>
+              <a:t>5/28/19</a:t>
             </a:fld>
             <a:endParaRPr lang="en-US"/>
           </a:p>
@@ -1755,7 +1765,7 @@
           <a:p>
             <a:fld id="{C77E8E39-1E32-2646-9620-EB65EC065088}" type="datetimeFigureOut">
               <a:rPr lang="en-US" smtClean="0"/>
-              <a:t>5/27/2019</a:t>
+              <a:t>5/28/19</a:t>
             </a:fld>
             <a:endParaRPr lang="en-US"/>
           </a:p>
@@ -2000,7 +2010,7 @@
           <a:p>
             <a:fld id="{C77E8E39-1E32-2646-9620-EB65EC065088}" type="datetimeFigureOut">
               <a:rPr lang="en-US" smtClean="0"/>
-              <a:t>5/27/2019</a:t>
+              <a:t>5/28/19</a:t>
             </a:fld>
             <a:endParaRPr lang="en-US"/>
           </a:p>
@@ -2229,7 +2239,7 @@
           <a:p>
             <a:fld id="{C77E8E39-1E32-2646-9620-EB65EC065088}" type="datetimeFigureOut">
               <a:rPr lang="en-US" smtClean="0"/>
-              <a:t>5/27/2019</a:t>
+              <a:t>5/28/19</a:t>
             </a:fld>
             <a:endParaRPr lang="en-US"/>
           </a:p>
@@ -2593,7 +2603,7 @@
           <a:p>
             <a:fld id="{C77E8E39-1E32-2646-9620-EB65EC065088}" type="datetimeFigureOut">
               <a:rPr lang="en-US" smtClean="0"/>
-              <a:t>5/27/2019</a:t>
+              <a:t>5/28/19</a:t>
             </a:fld>
             <a:endParaRPr lang="en-US"/>
           </a:p>
@@ -2710,7 +2720,7 @@
           <a:p>
             <a:fld id="{C77E8E39-1E32-2646-9620-EB65EC065088}" type="datetimeFigureOut">
               <a:rPr lang="en-US" smtClean="0"/>
-              <a:t>5/27/2019</a:t>
+              <a:t>5/28/19</a:t>
             </a:fld>
             <a:endParaRPr lang="en-US"/>
           </a:p>
@@ -2805,7 +2815,7 @@
           <a:p>
             <a:fld id="{C77E8E39-1E32-2646-9620-EB65EC065088}" type="datetimeFigureOut">
               <a:rPr lang="en-US" smtClean="0"/>
-              <a:t>5/27/2019</a:t>
+              <a:t>5/28/19</a:t>
             </a:fld>
             <a:endParaRPr lang="en-US"/>
           </a:p>
@@ -3080,7 +3090,7 @@
           <a:p>
             <a:fld id="{C77E8E39-1E32-2646-9620-EB65EC065088}" type="datetimeFigureOut">
               <a:rPr lang="en-US" smtClean="0"/>
-              <a:t>5/27/2019</a:t>
+              <a:t>5/28/19</a:t>
             </a:fld>
             <a:endParaRPr lang="en-US"/>
           </a:p>
@@ -3332,7 +3342,7 @@
           <a:p>
             <a:fld id="{C77E8E39-1E32-2646-9620-EB65EC065088}" type="datetimeFigureOut">
               <a:rPr lang="en-US" smtClean="0"/>
-              <a:t>5/27/2019</a:t>
+              <a:t>5/28/19</a:t>
             </a:fld>
             <a:endParaRPr lang="en-US"/>
           </a:p>
@@ -3543,7 +3553,7 @@
           <a:p>
             <a:fld id="{C77E8E39-1E32-2646-9620-EB65EC065088}" type="datetimeFigureOut">
               <a:rPr lang="en-US" smtClean="0"/>
-              <a:t>5/27/2019</a:t>
+              <a:t>5/28/19</a:t>
             </a:fld>
             <a:endParaRPr lang="en-US"/>
           </a:p>

</xml_diff>